<commit_message>
Add extra links from today's workshop
</commit_message>
<xml_diff>
--- a/2024_01_23_github.pptx
+++ b/2024_01_23_github.pptx
@@ -5,7 +5,7 @@
     <p:sldMasterId id="2147483675" r:id="rId1"/>
   </p:sldMasterIdLst>
   <p:notesMasterIdLst>
-    <p:notesMasterId r:id="rId14"/>
+    <p:notesMasterId r:id="rId15"/>
   </p:notesMasterIdLst>
   <p:sldIdLst>
     <p:sldId id="256" r:id="rId2"/>
@@ -19,7 +19,8 @@
     <p:sldId id="264" r:id="rId10"/>
     <p:sldId id="265" r:id="rId11"/>
     <p:sldId id="266" r:id="rId12"/>
-    <p:sldId id="267" r:id="rId13"/>
+    <p:sldId id="268" r:id="rId13"/>
+    <p:sldId id="267" r:id="rId14"/>
   </p:sldIdLst>
   <p:sldSz cx="12192000" cy="6858000"/>
   <p:notesSz cx="6858000" cy="9144000"/>
@@ -14343,7 +14344,7 @@
           <a:p>
             <a:fld id="{9A6FF971-0137-BB4C-A683-E48ED6A18C0C}" type="slidenum">
               <a:rPr lang="en-US" smtClean="0"/>
-              <a:t>12</a:t>
+              <a:t>13</a:t>
             </a:fld>
             <a:endParaRPr lang="en-US"/>
           </a:p>
@@ -19745,30 +19746,29 @@
               </a:lnSpc>
             </a:pPr>
             <a:r>
-              <a:rPr lang="en-US" sz="5100"/>
+              <a:rPr lang="en-US" sz="5100" dirty="0"/>
               <a:t>Intro to Version Control with Git and GitHub</a:t>
             </a:r>
             <a:br>
-              <a:rPr lang="en-US" sz="5100"/>
+              <a:rPr lang="en-US" sz="5100" dirty="0"/>
             </a:br>
             <a:br>
-              <a:rPr lang="en-US" sz="5100"/>
+              <a:rPr lang="en-US" sz="5100" dirty="0"/>
             </a:br>
             <a:r>
-              <a:rPr lang="en-US" sz="5100"/>
+              <a:rPr lang="en-US" sz="5100" dirty="0"/>
               <a:t>January 23, 2024</a:t>
             </a:r>
             <a:br>
-              <a:rPr lang="en-US" sz="5100"/>
+              <a:rPr lang="en-US" sz="5100" dirty="0"/>
             </a:br>
             <a:br>
-              <a:rPr lang="en-US" sz="5100"/>
+              <a:rPr lang="en-US" sz="5100" dirty="0"/>
             </a:br>
             <a:r>
-              <a:rPr lang="en-US" sz="5100"/>
+              <a:rPr lang="en-US" sz="5100" dirty="0"/>
               <a:t>Review Slides</a:t>
             </a:r>
-            <a:endParaRPr lang="en-US" sz="5100" dirty="0"/>
           </a:p>
         </p:txBody>
       </p:sp>
@@ -20451,6 +20451,147 @@
 </file>
 
 <file path=ppt/slides/slide12.xml><?xml version="1.0" encoding="utf-8"?>
+<p:sld xmlns:a="http://schemas.openxmlformats.org/drawingml/2006/main" xmlns:r="http://schemas.openxmlformats.org/officeDocument/2006/relationships" xmlns:p="http://schemas.openxmlformats.org/presentationml/2006/main">
+  <p:cSld>
+    <p:spTree>
+      <p:nvGrpSpPr>
+        <p:cNvPr id="1" name=""/>
+        <p:cNvGrpSpPr/>
+        <p:nvPr/>
+      </p:nvGrpSpPr>
+      <p:grpSpPr>
+        <a:xfrm>
+          <a:off x="0" y="0"/>
+          <a:ext cx="0" cy="0"/>
+          <a:chOff x="0" y="0"/>
+          <a:chExt cx="0" cy="0"/>
+        </a:xfrm>
+      </p:grpSpPr>
+      <p:sp>
+        <p:nvSpPr>
+          <p:cNvPr id="2" name="Title 1">
+            <a:extLst>
+              <a:ext uri="{FF2B5EF4-FFF2-40B4-BE49-F238E27FC236}">
+                <a16:creationId xmlns:a16="http://schemas.microsoft.com/office/drawing/2014/main" id="{4B27B290-76CB-8906-6EEF-AC03A7A881D5}"/>
+              </a:ext>
+            </a:extLst>
+          </p:cNvPr>
+          <p:cNvSpPr>
+            <a:spLocks noGrp="1"/>
+          </p:cNvSpPr>
+          <p:nvPr>
+            <p:ph type="title"/>
+          </p:nvPr>
+        </p:nvSpPr>
+        <p:spPr/>
+        <p:txBody>
+          <a:bodyPr/>
+          <a:lstStyle/>
+          <a:p>
+            <a:r>
+              <a:rPr lang="en-US" dirty="0"/>
+              <a:t>Final Links</a:t>
+            </a:r>
+          </a:p>
+        </p:txBody>
+      </p:sp>
+      <p:sp>
+        <p:nvSpPr>
+          <p:cNvPr id="3" name="Content Placeholder 2">
+            <a:extLst>
+              <a:ext uri="{FF2B5EF4-FFF2-40B4-BE49-F238E27FC236}">
+                <a16:creationId xmlns:a16="http://schemas.microsoft.com/office/drawing/2014/main" id="{260D3DBC-552B-3DDA-1A29-19102671E382}"/>
+              </a:ext>
+            </a:extLst>
+          </p:cNvPr>
+          <p:cNvSpPr>
+            <a:spLocks noGrp="1"/>
+          </p:cNvSpPr>
+          <p:nvPr>
+            <p:ph idx="1"/>
+          </p:nvPr>
+        </p:nvSpPr>
+        <p:spPr/>
+        <p:txBody>
+          <a:bodyPr/>
+          <a:lstStyle/>
+          <a:p>
+            <a:r>
+              <a:rPr lang="en-US" dirty="0"/>
+              <a:t>Creating SSH Keys (because of 2-factor, I recommend this going forward): </a:t>
+            </a:r>
+            <a:r>
+              <a:rPr lang="en-US" dirty="0">
+                <a:hlinkClick r:id="rId2"/>
+              </a:rPr>
+              <a:t>https://docs.github.com/en/authentication/connecting-to-github-with-ssh/generating-a-new-ssh-key-and-adding-it-to-the-ssh-agent</a:t>
+            </a:r>
+            <a:endParaRPr lang="en-US" dirty="0"/>
+          </a:p>
+          <a:p>
+            <a:r>
+              <a:rPr lang="en-US" dirty="0"/>
+              <a:t>Git browser game: </a:t>
+            </a:r>
+            <a:r>
+              <a:rPr lang="en-US" dirty="0">
+                <a:hlinkClick r:id="rId3"/>
+              </a:rPr>
+              <a:t>https://learngitbranching.js.org/</a:t>
+            </a:r>
+            <a:endParaRPr lang="en-US" dirty="0"/>
+          </a:p>
+          <a:p>
+            <a:r>
+              <a:rPr lang="en-US" dirty="0"/>
+              <a:t>Git book: </a:t>
+            </a:r>
+            <a:r>
+              <a:rPr lang="en-US" dirty="0">
+                <a:hlinkClick r:id="rId4"/>
+              </a:rPr>
+              <a:t>https://git-scm.com/book/en/v2</a:t>
+            </a:r>
+            <a:endParaRPr lang="en-US" dirty="0"/>
+          </a:p>
+          <a:p>
+            <a:r>
+              <a:rPr lang="en-US" dirty="0"/>
+              <a:t>My repo with sample tagging, code review, etc.: </a:t>
+            </a:r>
+            <a:r>
+              <a:rPr lang="en-US" dirty="0">
+                <a:hlinkClick r:id="rId5"/>
+              </a:rPr>
+              <a:t>https://github.com/niznik</a:t>
+            </a:r>
+            <a:r>
+              <a:rPr lang="en-US">
+                <a:hlinkClick r:id="rId5"/>
+              </a:rPr>
+              <a:t>-p/training-repo-jan-24</a:t>
+            </a:r>
+            <a:endParaRPr lang="en-US" dirty="0"/>
+          </a:p>
+          <a:p>
+            <a:endParaRPr lang="en-US" dirty="0"/>
+          </a:p>
+        </p:txBody>
+      </p:sp>
+    </p:spTree>
+    <p:extLst>
+      <p:ext uri="{BB962C8B-B14F-4D97-AF65-F5344CB8AC3E}">
+        <p14:creationId xmlns:p14="http://schemas.microsoft.com/office/powerpoint/2010/main" val="2915893048"/>
+      </p:ext>
+    </p:extLst>
+  </p:cSld>
+  <p:clrMapOvr>
+    <a:masterClrMapping/>
+  </p:clrMapOvr>
+</p:sld>
+</file>
+
+<file path=ppt/slides/slide13.xml><?xml version="1.0" encoding="utf-8"?>
 <p:sld xmlns:a="http://schemas.openxmlformats.org/drawingml/2006/main" xmlns:r="http://schemas.openxmlformats.org/officeDocument/2006/relationships" xmlns:p="http://schemas.openxmlformats.org/presentationml/2006/main">
   <p:cSld>
     <p:bg>

</xml_diff>